<commit_message>
Poster Media. Text Preprocessing Examples
</commit_message>
<xml_diff>
--- a/PosterMedia/PosterPics.pptx
+++ b/PosterMedia/PosterPics.pptx
@@ -6,9 +6,10 @@
   </p:sldMasterIdLst>
   <p:sldIdLst>
     <p:sldId id="256" r:id="rId2"/>
-    <p:sldId id="257" r:id="rId3"/>
-    <p:sldId id="258" r:id="rId4"/>
-    <p:sldId id="259" r:id="rId5"/>
+    <p:sldId id="260" r:id="rId3"/>
+    <p:sldId id="257" r:id="rId4"/>
+    <p:sldId id="258" r:id="rId5"/>
+    <p:sldId id="259" r:id="rId6"/>
   </p:sldIdLst>
   <p:sldSz cx="12192000" cy="6858000"/>
   <p:notesSz cx="6858000" cy="9144000"/>
@@ -4477,46 +4478,640 @@
           <a:chExt cx="0" cy="0"/>
         </a:xfrm>
       </p:grpSpPr>
-      <p:pic>
-        <p:nvPicPr>
-          <p:cNvPr id="5" name="Picture 4">
-            <a:extLst>
-              <a:ext uri="{FF2B5EF4-FFF2-40B4-BE49-F238E27FC236}">
-                <a16:creationId xmlns:a16="http://schemas.microsoft.com/office/drawing/2014/main" id="{7EB2B018-EFC1-4EE0-9E7F-1130198682F3}"/>
-              </a:ext>
-            </a:extLst>
-          </p:cNvPr>
-          <p:cNvPicPr>
-            <a:picLocks noChangeAspect="1"/>
-          </p:cNvPicPr>
+      <p:sp>
+        <p:nvSpPr>
+          <p:cNvPr id="2" name="Title 1">
+            <a:extLst>
+              <a:ext uri="{FF2B5EF4-FFF2-40B4-BE49-F238E27FC236}">
+                <a16:creationId xmlns:a16="http://schemas.microsoft.com/office/drawing/2014/main" id="{28ADEB13-6F24-4157-BC43-2DC430C437C8}"/>
+              </a:ext>
+            </a:extLst>
+          </p:cNvPr>
+          <p:cNvSpPr>
+            <a:spLocks noGrp="1"/>
+          </p:cNvSpPr>
+          <p:nvPr>
+            <p:ph type="title"/>
+          </p:nvPr>
+        </p:nvSpPr>
+        <p:spPr>
+          <a:xfrm>
+            <a:off x="866335" y="0"/>
+            <a:ext cx="10515600" cy="590843"/>
+          </a:xfrm>
+        </p:spPr>
+        <p:txBody>
+          <a:bodyPr>
+            <a:normAutofit/>
+          </a:bodyPr>
+          <a:lstStyle/>
+          <a:p>
+            <a:pPr algn="ctr"/>
+            <a:r>
+              <a:rPr lang="en-US" sz="2200" b="1" dirty="0"/>
+              <a:t>Examples of Text Preprocessing</a:t>
+            </a:r>
+          </a:p>
+        </p:txBody>
+      </p:sp>
+      <p:sp>
+        <p:nvSpPr>
+          <p:cNvPr id="4" name="Rectangle 3">
+            <a:extLst>
+              <a:ext uri="{FF2B5EF4-FFF2-40B4-BE49-F238E27FC236}">
+                <a16:creationId xmlns:a16="http://schemas.microsoft.com/office/drawing/2014/main" id="{D217C9F2-7C40-40F1-988E-888895AE8A0D}"/>
+              </a:ext>
+            </a:extLst>
+          </p:cNvPr>
+          <p:cNvSpPr/>
           <p:nvPr/>
-        </p:nvPicPr>
-        <p:blipFill>
-          <a:blip r:embed="rId2">
-            <a:extLst>
-              <a:ext uri="{28A0092B-C50C-407E-A947-70E740481C1C}">
-                <a14:useLocalDpi xmlns:a14="http://schemas.microsoft.com/office/drawing/2010/main" val="0"/>
-              </a:ext>
-            </a:extLst>
-          </a:blip>
-          <a:stretch>
-            <a:fillRect/>
-          </a:stretch>
-        </p:blipFill>
+        </p:nvSpPr>
         <p:spPr>
           <a:xfrm>
-            <a:off x="2646182" y="0"/>
-            <a:ext cx="6899636" cy="6858000"/>
+            <a:off x="6344529" y="590843"/>
+            <a:ext cx="5791200" cy="5355312"/>
           </a:xfrm>
           <a:prstGeom prst="rect">
             <a:avLst/>
           </a:prstGeom>
         </p:spPr>
-      </p:pic>
+        <p:txBody>
+          <a:bodyPr wrap="square">
+            <a:spAutoFit/>
+          </a:bodyPr>
+          <a:lstStyle/>
+          <a:p>
+            <a:r>
+              <a:rPr lang="en-US" dirty="0"/>
+              <a:t>['idea', '</a:t>
+            </a:r>
+            <a:r>
+              <a:rPr lang="en-US" dirty="0" err="1"/>
+              <a:t>deserialize</a:t>
+            </a:r>
+            <a:r>
+              <a:rPr lang="en-US" dirty="0"/>
+              <a:t>', 'mix', '</a:t>
+            </a:r>
+            <a:r>
+              <a:rPr lang="en-US" dirty="0" err="1"/>
+              <a:t>json_string</a:t>
+            </a:r>
+            <a:r>
+              <a:rPr lang="en-US" dirty="0"/>
+              <a:t>', '</a:t>
+            </a:r>
+            <a:r>
+              <a:rPr lang="en-US" dirty="0" err="1"/>
+              <a:t>gson</a:t>
+            </a:r>
+            <a:r>
+              <a:rPr lang="en-US" dirty="0"/>
+              <a:t>']</a:t>
+            </a:r>
+          </a:p>
+          <a:p>
+            <a:r>
+              <a:rPr lang="en-US" b="1" dirty="0"/>
+              <a:t>['</a:t>
+            </a:r>
+            <a:r>
+              <a:rPr lang="en-US" b="1" dirty="0" err="1"/>
+              <a:t>glsl</a:t>
+            </a:r>
+            <a:r>
+              <a:rPr lang="en-US" b="1" dirty="0"/>
+              <a:t>', 'smooth', 'reference', 'grid', 'plane']</a:t>
+            </a:r>
+          </a:p>
+          <a:p>
+            <a:r>
+              <a:rPr lang="en-US" dirty="0"/>
+              <a:t>['compiler', 'language', 'runtime', 'vs.', 'middleware']</a:t>
+            </a:r>
+          </a:p>
+          <a:p>
+            <a:r>
+              <a:rPr lang="en-US" b="1" dirty="0"/>
+              <a:t>['detect', 'object', 'image', '</a:t>
+            </a:r>
+            <a:r>
+              <a:rPr lang="en-US" b="1" dirty="0" err="1"/>
+              <a:t>opencv</a:t>
+            </a:r>
+            <a:r>
+              <a:rPr lang="en-US" b="1" dirty="0"/>
+              <a:t>']</a:t>
+            </a:r>
+          </a:p>
+          <a:p>
+            <a:r>
+              <a:rPr lang="en-US" dirty="0"/>
+              <a:t>['rap', 'installation', 'installation']</a:t>
+            </a:r>
+          </a:p>
+          <a:p>
+            <a:r>
+              <a:rPr lang="en-US" b="1" dirty="0"/>
+              <a:t>['reference', '</a:t>
+            </a:r>
+            <a:r>
+              <a:rPr lang="en-US" b="1" dirty="0" err="1"/>
+              <a:t>cg_shader</a:t>
+            </a:r>
+            <a:r>
+              <a:rPr lang="en-US" b="1" dirty="0"/>
+              <a:t>', 'language']</a:t>
+            </a:r>
+          </a:p>
+          <a:p>
+            <a:r>
+              <a:rPr lang="en-US" dirty="0"/>
+              <a:t>['vehicle', 'segmentation', 'track']</a:t>
+            </a:r>
+          </a:p>
+          <a:p>
+            <a:r>
+              <a:rPr lang="en-US" b="1" dirty="0"/>
+              <a:t>['</a:t>
+            </a:r>
+            <a:r>
+              <a:rPr lang="en-US" b="1" dirty="0" err="1"/>
+              <a:t>sslhandshakeexception</a:t>
+            </a:r>
+            <a:r>
+              <a:rPr lang="en-US" b="1" dirty="0"/>
+              <a:t>', 't3s', '</a:t>
+            </a:r>
+            <a:r>
+              <a:rPr lang="en-US" b="1" dirty="0" err="1"/>
+              <a:t>weblogic</a:t>
+            </a:r>
+            <a:r>
+              <a:rPr lang="en-US" b="1" dirty="0"/>
+              <a:t>']</a:t>
+            </a:r>
+          </a:p>
+          <a:p>
+            <a:r>
+              <a:rPr lang="en-US" dirty="0"/>
+              <a:t>['</a:t>
+            </a:r>
+            <a:r>
+              <a:rPr lang="en-US" dirty="0" err="1"/>
+              <a:t>string.format</a:t>
+            </a:r>
+            <a:r>
+              <a:rPr lang="en-US" dirty="0"/>
+              <a:t>', '</a:t>
+            </a:r>
+            <a:r>
+              <a:rPr lang="en-US" dirty="0" err="1"/>
+              <a:t>freemarker</a:t>
+            </a:r>
+            <a:r>
+              <a:rPr lang="en-US" dirty="0"/>
+              <a:t>']</a:t>
+            </a:r>
+          </a:p>
+          <a:p>
+            <a:r>
+              <a:rPr lang="en-US" b="1" dirty="0"/>
+              <a:t>['</a:t>
+            </a:r>
+            <a:r>
+              <a:rPr lang="en-US" b="1" dirty="0" err="1"/>
+              <a:t>nsnotification</a:t>
+            </a:r>
+            <a:r>
+              <a:rPr lang="en-US" b="1" dirty="0"/>
+              <a:t>', 'datum']</a:t>
+            </a:r>
+          </a:p>
+          <a:p>
+            <a:r>
+              <a:rPr lang="en-US" dirty="0"/>
+              <a:t>['</a:t>
+            </a:r>
+            <a:r>
+              <a:rPr lang="en-US" dirty="0" err="1"/>
+              <a:t>lat_lon</a:t>
+            </a:r>
+            <a:r>
+              <a:rPr lang="en-US" dirty="0"/>
+              <a:t>', 'panorama', 'image']</a:t>
+            </a:r>
+          </a:p>
+          <a:p>
+            <a:r>
+              <a:rPr lang="en-US" b="1" dirty="0"/>
+              <a:t>['metadata', '</a:t>
+            </a:r>
+            <a:r>
+              <a:rPr lang="en-US" b="1" dirty="0" err="1"/>
+              <a:t>llvm_ir</a:t>
+            </a:r>
+            <a:r>
+              <a:rPr lang="en-US" b="1" dirty="0"/>
+              <a:t>', 'c', '</a:t>
+            </a:r>
+            <a:r>
+              <a:rPr lang="en-US" b="1" dirty="0" err="1"/>
+              <a:t>api</a:t>
+            </a:r>
+            <a:r>
+              <a:rPr lang="en-US" b="1" dirty="0"/>
+              <a:t>']</a:t>
+            </a:r>
+          </a:p>
+          <a:p>
+            <a:r>
+              <a:rPr lang="en-US" dirty="0"/>
+              <a:t>['pixel', 'transparent', '</a:t>
+            </a:r>
+            <a:r>
+              <a:rPr lang="en-US" dirty="0" err="1"/>
+              <a:t>opencv</a:t>
+            </a:r>
+            <a:r>
+              <a:rPr lang="en-US" dirty="0"/>
+              <a:t>', 'python']</a:t>
+            </a:r>
+          </a:p>
+          <a:p>
+            <a:r>
+              <a:rPr lang="en-US" b="1" dirty="0"/>
+              <a:t>['jar', 'jar', '</a:t>
+            </a:r>
+            <a:r>
+              <a:rPr lang="en-US" b="1" dirty="0" err="1"/>
+              <a:t>jndilocalhost</a:t>
+            </a:r>
+            <a:r>
+              <a:rPr lang="en-US" b="1" dirty="0"/>
+              <a:t>', '</a:t>
+            </a:r>
+            <a:r>
+              <a:rPr lang="en-US" b="1" dirty="0" err="1"/>
+              <a:t>ttsvr</a:t>
+            </a:r>
+            <a:r>
+              <a:rPr lang="en-US" b="1" dirty="0"/>
+              <a:t>', '</a:t>
+            </a:r>
+            <a:r>
+              <a:rPr lang="en-US" b="1" dirty="0" err="1"/>
+              <a:t>web_inf</a:t>
+            </a:r>
+            <a:r>
+              <a:rPr lang="en-US" b="1" dirty="0"/>
+              <a:t>', 'lib', </a:t>
+            </a:r>
+            <a:r>
+              <a:rPr lang="en-US" dirty="0"/>
+              <a:t>'</a:t>
+            </a:r>
+            <a:r>
+              <a:rPr lang="en-US" dirty="0" err="1"/>
+              <a:t>activation.jarnull</a:t>
+            </a:r>
+            <a:r>
+              <a:rPr lang="en-US" dirty="0"/>
+              <a:t>', '</a:t>
+            </a:r>
+            <a:r>
+              <a:rPr lang="en-US" dirty="0" err="1"/>
+              <a:t>tld</a:t>
+            </a:r>
+            <a:r>
+              <a:rPr lang="en-US" dirty="0"/>
+              <a:t>', 'file']</a:t>
+            </a:r>
+          </a:p>
+          <a:p>
+            <a:r>
+              <a:rPr lang="en-US" b="1" dirty="0"/>
+              <a:t>['</a:t>
+            </a:r>
+            <a:r>
+              <a:rPr lang="en-US" b="1" dirty="0" err="1"/>
+              <a:t>eglimagekhr</a:t>
+            </a:r>
+            <a:r>
+              <a:rPr lang="en-US" b="1" dirty="0"/>
+              <a:t>', 'greyscale']</a:t>
+            </a:r>
+          </a:p>
+          <a:p>
+            <a:r>
+              <a:rPr lang="en-US" dirty="0"/>
+              <a:t>['scroll', '</a:t>
+            </a:r>
+            <a:r>
+              <a:rPr lang="en-US" dirty="0" err="1"/>
+              <a:t>searchresponse</a:t>
+            </a:r>
+            <a:r>
+              <a:rPr lang="en-US" dirty="0"/>
+              <a:t>', '</a:t>
+            </a:r>
+            <a:r>
+              <a:rPr lang="en-US" dirty="0" err="1"/>
+              <a:t>iterable</a:t>
+            </a:r>
+            <a:r>
+              <a:rPr lang="en-US" dirty="0"/>
+              <a:t>', 'result', '</a:t>
+            </a:r>
+            <a:r>
+              <a:rPr lang="en-US" dirty="0" err="1"/>
+              <a:t>scrollsize</a:t>
+            </a:r>
+            <a:r>
+              <a:rPr lang="en-US" dirty="0"/>
+              <a:t>', 'set’]</a:t>
+            </a:r>
+          </a:p>
+          <a:p>
+            <a:endParaRPr lang="en-US" dirty="0"/>
+          </a:p>
+          <a:p>
+            <a:r>
+              <a:rPr lang="en-US" b="1" dirty="0"/>
+              <a:t>['</a:t>
+            </a:r>
+            <a:r>
+              <a:rPr lang="en-US" b="1" dirty="0" err="1"/>
+              <a:t>real_world</a:t>
+            </a:r>
+            <a:r>
+              <a:rPr lang="en-US" b="1" dirty="0"/>
+              <a:t>', 'translation', 'camera', '</a:t>
+            </a:r>
+            <a:r>
+              <a:rPr lang="en-US" b="1" dirty="0" err="1"/>
+              <a:t>feature_match</a:t>
+            </a:r>
+            <a:r>
+              <a:rPr lang="en-US" b="1" dirty="0"/>
+              <a:t>']</a:t>
+            </a:r>
+          </a:p>
+        </p:txBody>
+      </p:sp>
+      <p:sp>
+        <p:nvSpPr>
+          <p:cNvPr id="6" name="Rectangle 5">
+            <a:extLst>
+              <a:ext uri="{FF2B5EF4-FFF2-40B4-BE49-F238E27FC236}">
+                <a16:creationId xmlns:a16="http://schemas.microsoft.com/office/drawing/2014/main" id="{E330BD98-C370-463F-9302-F0F82FA699FF}"/>
+              </a:ext>
+            </a:extLst>
+          </p:cNvPr>
+          <p:cNvSpPr/>
+          <p:nvPr/>
+        </p:nvSpPr>
+        <p:spPr>
+          <a:xfrm>
+            <a:off x="0" y="590843"/>
+            <a:ext cx="6344529" cy="5632311"/>
+          </a:xfrm>
+          <a:prstGeom prst="rect">
+            <a:avLst/>
+          </a:prstGeom>
+        </p:spPr>
+        <p:txBody>
+          <a:bodyPr wrap="square">
+            <a:spAutoFit/>
+          </a:bodyPr>
+          <a:lstStyle/>
+          <a:p>
+            <a:r>
+              <a:rPr lang="en-US" dirty="0"/>
+              <a:t>Any idea of </a:t>
+            </a:r>
+            <a:r>
+              <a:rPr lang="en-US" dirty="0" err="1"/>
+              <a:t>deserialize</a:t>
+            </a:r>
+            <a:r>
+              <a:rPr lang="en-US" dirty="0"/>
+              <a:t> mixed </a:t>
+            </a:r>
+            <a:r>
+              <a:rPr lang="en-US" dirty="0" err="1"/>
+              <a:t>json</a:t>
+            </a:r>
+            <a:r>
+              <a:rPr lang="en-US" dirty="0"/>
+              <a:t> string in </a:t>
+            </a:r>
+            <a:r>
+              <a:rPr lang="en-US" dirty="0" err="1"/>
+              <a:t>gson</a:t>
+            </a:r>
+            <a:r>
+              <a:rPr lang="en-US" dirty="0"/>
+              <a:t>?</a:t>
+            </a:r>
+          </a:p>
+          <a:p>
+            <a:r>
+              <a:rPr lang="en-US" b="1" dirty="0"/>
+              <a:t>Using GLSL to render a smooth reference grid on a plane</a:t>
+            </a:r>
+          </a:p>
+          <a:p>
+            <a:r>
+              <a:rPr lang="en-US" dirty="0"/>
+              <a:t>Compiler/language runtime vs. Middleware</a:t>
+            </a:r>
+          </a:p>
+          <a:p>
+            <a:r>
+              <a:rPr lang="en-US" b="1" dirty="0"/>
+              <a:t>Detect objects in an image </a:t>
+            </a:r>
+            <a:r>
+              <a:rPr lang="en-US" b="1" dirty="0" err="1"/>
+              <a:t>opencv</a:t>
+            </a:r>
+            <a:endParaRPr lang="en-US" b="1" dirty="0"/>
+          </a:p>
+          <a:p>
+            <a:r>
+              <a:rPr lang="en-US" dirty="0"/>
+              <a:t>RAP installation and necessary things to include while installation</a:t>
+            </a:r>
+          </a:p>
+          <a:p>
+            <a:r>
+              <a:rPr lang="en-US" b="1" dirty="0"/>
+              <a:t>Where can I find a reference of the CG </a:t>
+            </a:r>
+            <a:r>
+              <a:rPr lang="en-US" b="1" dirty="0" err="1"/>
+              <a:t>shader</a:t>
+            </a:r>
+            <a:r>
+              <a:rPr lang="en-US" b="1" dirty="0"/>
+              <a:t> language?</a:t>
+            </a:r>
+          </a:p>
+          <a:p>
+            <a:r>
+              <a:rPr lang="en-US" dirty="0"/>
+              <a:t>Vehicle segmentation and tracking</a:t>
+            </a:r>
+          </a:p>
+          <a:p>
+            <a:r>
+              <a:rPr lang="en-US" b="1" dirty="0" err="1"/>
+              <a:t>SSLHandshakeException</a:t>
+            </a:r>
+            <a:r>
+              <a:rPr lang="en-US" b="1" dirty="0"/>
+              <a:t> using t3s </a:t>
+            </a:r>
+            <a:r>
+              <a:rPr lang="en-US" b="1" dirty="0" err="1"/>
+              <a:t>weblogic</a:t>
+            </a:r>
+            <a:endParaRPr lang="en-US" b="1" dirty="0"/>
+          </a:p>
+          <a:p>
+            <a:r>
+              <a:rPr lang="en-US" dirty="0" err="1"/>
+              <a:t>String.format</a:t>
+            </a:r>
+            <a:r>
+              <a:rPr lang="en-US" dirty="0"/>
+              <a:t> in </a:t>
+            </a:r>
+            <a:r>
+              <a:rPr lang="en-US" dirty="0" err="1"/>
+              <a:t>FreeMarker</a:t>
+            </a:r>
+            <a:endParaRPr lang="en-US" dirty="0"/>
+          </a:p>
+          <a:p>
+            <a:r>
+              <a:rPr lang="en-US" b="1" dirty="0" err="1"/>
+              <a:t>NSNotification</a:t>
+            </a:r>
+            <a:r>
+              <a:rPr lang="en-US" b="1" dirty="0"/>
+              <a:t> if data changes</a:t>
+            </a:r>
+          </a:p>
+          <a:p>
+            <a:r>
+              <a:rPr lang="en-US" dirty="0"/>
+              <a:t>How to project Lat/Lon coordinates on a panorama image?</a:t>
+            </a:r>
+          </a:p>
+          <a:p>
+            <a:r>
+              <a:rPr lang="en-US" b="1" dirty="0"/>
+              <a:t>How to attach metadata to LLVM IR using the C++ API?</a:t>
+            </a:r>
+          </a:p>
+          <a:p>
+            <a:r>
+              <a:rPr lang="en-US" dirty="0"/>
+              <a:t>How particular pixel to transparent in </a:t>
+            </a:r>
+            <a:r>
+              <a:rPr lang="en-US" dirty="0" err="1"/>
+              <a:t>opencv</a:t>
+            </a:r>
+            <a:r>
+              <a:rPr lang="en-US" dirty="0"/>
+              <a:t> python?</a:t>
+            </a:r>
+          </a:p>
+          <a:p>
+            <a:r>
+              <a:rPr lang="en-US" b="1" dirty="0"/>
+              <a:t>Failed to process JAR [</a:t>
+            </a:r>
+            <a:r>
+              <a:rPr lang="en-US" b="1" dirty="0" err="1"/>
+              <a:t>jar:jndi</a:t>
+            </a:r>
+            <a:r>
+              <a:rPr lang="en-US" b="1" dirty="0"/>
+              <a:t>:/localhost/</a:t>
+            </a:r>
+            <a:r>
+              <a:rPr lang="en-US" b="1" dirty="0" err="1"/>
+              <a:t>ttsvr</a:t>
+            </a:r>
+            <a:r>
+              <a:rPr lang="en-US" b="1" dirty="0"/>
+              <a:t>/WEB-</a:t>
+            </a:r>
+            <a:r>
+              <a:rPr lang="en-US" dirty="0"/>
+              <a:t>INF/lib/activation.jar!/null] for TLD files</a:t>
+            </a:r>
+          </a:p>
+          <a:p>
+            <a:r>
+              <a:rPr lang="en-US" b="1" dirty="0"/>
+              <a:t>Converting </a:t>
+            </a:r>
+            <a:r>
+              <a:rPr lang="en-US" b="1" dirty="0" err="1"/>
+              <a:t>EGLImageKHR</a:t>
+            </a:r>
+            <a:r>
+              <a:rPr lang="en-US" b="1" dirty="0"/>
+              <a:t> to greyscale</a:t>
+            </a:r>
+          </a:p>
+          <a:p>
+            <a:r>
+              <a:rPr lang="en-US" dirty="0"/>
+              <a:t>Scroll </a:t>
+            </a:r>
+            <a:r>
+              <a:rPr lang="en-US" dirty="0" err="1"/>
+              <a:t>SearchResponse</a:t>
+            </a:r>
+            <a:r>
+              <a:rPr lang="en-US" dirty="0"/>
+              <a:t> not </a:t>
+            </a:r>
+            <a:r>
+              <a:rPr lang="en-US" dirty="0" err="1"/>
+              <a:t>iterable</a:t>
+            </a:r>
+            <a:r>
+              <a:rPr lang="en-US" dirty="0"/>
+              <a:t> when there are less results than the </a:t>
+            </a:r>
+            <a:r>
+              <a:rPr lang="en-US" dirty="0" err="1"/>
+              <a:t>scrollSize</a:t>
+            </a:r>
+            <a:r>
+              <a:rPr lang="en-US" dirty="0"/>
+              <a:t> setting</a:t>
+            </a:r>
+          </a:p>
+          <a:p>
+            <a:r>
+              <a:rPr lang="en-US" b="1" dirty="0"/>
+              <a:t>Estimating real world translation between two cameras through feature matching</a:t>
+            </a:r>
+          </a:p>
+        </p:txBody>
+      </p:sp>
     </p:spTree>
     <p:extLst>
       <p:ext uri="{BB962C8B-B14F-4D97-AF65-F5344CB8AC3E}">
-        <p14:creationId xmlns:p14="http://schemas.microsoft.com/office/powerpoint/2010/main" val="2969070191"/>
+        <p14:creationId xmlns:p14="http://schemas.microsoft.com/office/powerpoint/2010/main" val="1889770399"/>
       </p:ext>
     </p:extLst>
   </p:cSld>
@@ -4543,6 +5138,72 @@
           <a:chExt cx="0" cy="0"/>
         </a:xfrm>
       </p:grpSpPr>
+      <p:pic>
+        <p:nvPicPr>
+          <p:cNvPr id="5" name="Picture 4">
+            <a:extLst>
+              <a:ext uri="{FF2B5EF4-FFF2-40B4-BE49-F238E27FC236}">
+                <a16:creationId xmlns:a16="http://schemas.microsoft.com/office/drawing/2014/main" id="{7EB2B018-EFC1-4EE0-9E7F-1130198682F3}"/>
+              </a:ext>
+            </a:extLst>
+          </p:cNvPr>
+          <p:cNvPicPr>
+            <a:picLocks noChangeAspect="1"/>
+          </p:cNvPicPr>
+          <p:nvPr/>
+        </p:nvPicPr>
+        <p:blipFill>
+          <a:blip r:embed="rId2">
+            <a:extLst>
+              <a:ext uri="{28A0092B-C50C-407E-A947-70E740481C1C}">
+                <a14:useLocalDpi xmlns:a14="http://schemas.microsoft.com/office/drawing/2010/main" val="0"/>
+              </a:ext>
+            </a:extLst>
+          </a:blip>
+          <a:stretch>
+            <a:fillRect/>
+          </a:stretch>
+        </p:blipFill>
+        <p:spPr>
+          <a:xfrm>
+            <a:off x="2646182" y="0"/>
+            <a:ext cx="6899636" cy="6858000"/>
+          </a:xfrm>
+          <a:prstGeom prst="rect">
+            <a:avLst/>
+          </a:prstGeom>
+        </p:spPr>
+      </p:pic>
+    </p:spTree>
+    <p:extLst>
+      <p:ext uri="{BB962C8B-B14F-4D97-AF65-F5344CB8AC3E}">
+        <p14:creationId xmlns:p14="http://schemas.microsoft.com/office/powerpoint/2010/main" val="2969070191"/>
+      </p:ext>
+    </p:extLst>
+  </p:cSld>
+  <p:clrMapOvr>
+    <a:masterClrMapping/>
+  </p:clrMapOvr>
+</p:sld>
+</file>
+
+<file path=ppt/slides/slide4.xml><?xml version="1.0" encoding="utf-8"?>
+<p:sld xmlns:a="http://schemas.openxmlformats.org/drawingml/2006/main" xmlns:r="http://schemas.openxmlformats.org/officeDocument/2006/relationships" xmlns:p="http://schemas.openxmlformats.org/presentationml/2006/main">
+  <p:cSld>
+    <p:spTree>
+      <p:nvGrpSpPr>
+        <p:cNvPr id="1" name=""/>
+        <p:cNvGrpSpPr/>
+        <p:nvPr/>
+      </p:nvGrpSpPr>
+      <p:grpSpPr>
+        <a:xfrm>
+          <a:off x="0" y="0"/>
+          <a:ext cx="0" cy="0"/>
+          <a:chOff x="0" y="0"/>
+          <a:chExt cx="0" cy="0"/>
+        </a:xfrm>
+      </p:grpSpPr>
       <p:sp>
         <p:nvSpPr>
           <p:cNvPr id="85" name="Rectangle 84">
@@ -5266,7 +5927,7 @@
 </p:sld>
 </file>
 
-<file path=ppt/slides/slide4.xml><?xml version="1.0" encoding="utf-8"?>
+<file path=ppt/slides/slide5.xml><?xml version="1.0" encoding="utf-8"?>
 <p:sld xmlns:a="http://schemas.openxmlformats.org/drawingml/2006/main" xmlns:r="http://schemas.openxmlformats.org/officeDocument/2006/relationships" xmlns:p="http://schemas.openxmlformats.org/presentationml/2006/main">
   <p:cSld>
     <p:spTree>

</xml_diff>